<commit_message>
Writing your first program in Java #1
</commit_message>
<xml_diff>
--- a/Webinar.pptx
+++ b/Webinar.pptx
@@ -314,7 +314,7 @@
           <a:p>
             <a:fld id="{79E1C1AB-56A0-45EF-B181-CDDA2DAEED7E}" type="datetimeFigureOut">
               <a:rPr lang="en-US" smtClean="0"/>
-              <a:t>6/4/2020</a:t>
+              <a:t>6/6/2020</a:t>
             </a:fld>
             <a:endParaRPr lang="en-US"/>
           </a:p>
@@ -589,7 +589,7 @@
           <a:p>
             <a:fld id="{79E1C1AB-56A0-45EF-B181-CDDA2DAEED7E}" type="datetimeFigureOut">
               <a:rPr lang="en-US" smtClean="0"/>
-              <a:t>6/4/2020</a:t>
+              <a:t>6/6/2020</a:t>
             </a:fld>
             <a:endParaRPr lang="en-US"/>
           </a:p>
@@ -783,7 +783,7 @@
           <a:p>
             <a:fld id="{79E1C1AB-56A0-45EF-B181-CDDA2DAEED7E}" type="datetimeFigureOut">
               <a:rPr lang="en-US" smtClean="0"/>
-              <a:t>6/4/2020</a:t>
+              <a:t>6/6/2020</a:t>
             </a:fld>
             <a:endParaRPr lang="en-US"/>
           </a:p>
@@ -1051,7 +1051,7 @@
           <a:p>
             <a:fld id="{79E1C1AB-56A0-45EF-B181-CDDA2DAEED7E}" type="datetimeFigureOut">
               <a:rPr lang="en-US" smtClean="0"/>
-              <a:t>6/4/2020</a:t>
+              <a:t>6/6/2020</a:t>
             </a:fld>
             <a:endParaRPr lang="en-US"/>
           </a:p>
@@ -1383,7 +1383,7 @@
           <a:p>
             <a:fld id="{79E1C1AB-56A0-45EF-B181-CDDA2DAEED7E}" type="datetimeFigureOut">
               <a:rPr lang="en-US" smtClean="0"/>
-              <a:t>6/4/2020</a:t>
+              <a:t>6/6/2020</a:t>
             </a:fld>
             <a:endParaRPr lang="en-US"/>
           </a:p>
@@ -1993,7 +1993,7 @@
           <a:p>
             <a:fld id="{79E1C1AB-56A0-45EF-B181-CDDA2DAEED7E}" type="datetimeFigureOut">
               <a:rPr lang="en-US" smtClean="0"/>
-              <a:t>6/4/2020</a:t>
+              <a:t>6/6/2020</a:t>
             </a:fld>
             <a:endParaRPr lang="en-US"/>
           </a:p>
@@ -2840,7 +2840,7 @@
           <a:p>
             <a:fld id="{79E1C1AB-56A0-45EF-B181-CDDA2DAEED7E}" type="datetimeFigureOut">
               <a:rPr lang="en-US" smtClean="0"/>
-              <a:t>6/4/2020</a:t>
+              <a:t>6/6/2020</a:t>
             </a:fld>
             <a:endParaRPr lang="en-US"/>
           </a:p>
@@ -3010,7 +3010,7 @@
           <a:p>
             <a:fld id="{79E1C1AB-56A0-45EF-B181-CDDA2DAEED7E}" type="datetimeFigureOut">
               <a:rPr lang="en-US" smtClean="0"/>
-              <a:t>6/4/2020</a:t>
+              <a:t>6/6/2020</a:t>
             </a:fld>
             <a:endParaRPr lang="en-US"/>
           </a:p>
@@ -3190,7 +3190,7 @@
           <a:p>
             <a:fld id="{79E1C1AB-56A0-45EF-B181-CDDA2DAEED7E}" type="datetimeFigureOut">
               <a:rPr lang="en-US" smtClean="0"/>
-              <a:t>6/4/2020</a:t>
+              <a:t>6/6/2020</a:t>
             </a:fld>
             <a:endParaRPr lang="en-US"/>
           </a:p>
@@ -3360,7 +3360,7 @@
           <a:p>
             <a:fld id="{79E1C1AB-56A0-45EF-B181-CDDA2DAEED7E}" type="datetimeFigureOut">
               <a:rPr lang="en-US" smtClean="0"/>
-              <a:t>6/4/2020</a:t>
+              <a:t>6/6/2020</a:t>
             </a:fld>
             <a:endParaRPr lang="en-US"/>
           </a:p>
@@ -3604,7 +3604,7 @@
           <a:p>
             <a:fld id="{79E1C1AB-56A0-45EF-B181-CDDA2DAEED7E}" type="datetimeFigureOut">
               <a:rPr lang="en-US" smtClean="0"/>
-              <a:t>6/4/2020</a:t>
+              <a:t>6/6/2020</a:t>
             </a:fld>
             <a:endParaRPr lang="en-US"/>
           </a:p>
@@ -3896,7 +3896,7 @@
           <a:p>
             <a:fld id="{79E1C1AB-56A0-45EF-B181-CDDA2DAEED7E}" type="datetimeFigureOut">
               <a:rPr lang="en-US" smtClean="0"/>
-              <a:t>6/4/2020</a:t>
+              <a:t>6/6/2020</a:t>
             </a:fld>
             <a:endParaRPr lang="en-US"/>
           </a:p>
@@ -4334,7 +4334,7 @@
           <a:p>
             <a:fld id="{79E1C1AB-56A0-45EF-B181-CDDA2DAEED7E}" type="datetimeFigureOut">
               <a:rPr lang="en-US" smtClean="0"/>
-              <a:t>6/4/2020</a:t>
+              <a:t>6/6/2020</a:t>
             </a:fld>
             <a:endParaRPr lang="en-US"/>
           </a:p>
@@ -4452,7 +4452,7 @@
           <a:p>
             <a:fld id="{79E1C1AB-56A0-45EF-B181-CDDA2DAEED7E}" type="datetimeFigureOut">
               <a:rPr lang="en-US" smtClean="0"/>
-              <a:t>6/4/2020</a:t>
+              <a:t>6/6/2020</a:t>
             </a:fld>
             <a:endParaRPr lang="en-US"/>
           </a:p>
@@ -4547,7 +4547,7 @@
           <a:p>
             <a:fld id="{79E1C1AB-56A0-45EF-B181-CDDA2DAEED7E}" type="datetimeFigureOut">
               <a:rPr lang="en-US" smtClean="0"/>
-              <a:t>6/4/2020</a:t>
+              <a:t>6/6/2020</a:t>
             </a:fld>
             <a:endParaRPr lang="en-US"/>
           </a:p>
@@ -4826,7 +4826,7 @@
           <a:p>
             <a:fld id="{79E1C1AB-56A0-45EF-B181-CDDA2DAEED7E}" type="datetimeFigureOut">
               <a:rPr lang="en-US" smtClean="0"/>
-              <a:t>6/4/2020</a:t>
+              <a:t>6/6/2020</a:t>
             </a:fld>
             <a:endParaRPr lang="en-US"/>
           </a:p>
@@ -5101,7 +5101,7 @@
           <a:p>
             <a:fld id="{79E1C1AB-56A0-45EF-B181-CDDA2DAEED7E}" type="datetimeFigureOut">
               <a:rPr lang="en-US" smtClean="0"/>
-              <a:t>6/4/2020</a:t>
+              <a:t>6/6/2020</a:t>
             </a:fld>
             <a:endParaRPr lang="en-US"/>
           </a:p>
@@ -5530,7 +5530,7 @@
           <a:p>
             <a:fld id="{79E1C1AB-56A0-45EF-B181-CDDA2DAEED7E}" type="datetimeFigureOut">
               <a:rPr lang="en-US" smtClean="0"/>
-              <a:t>6/4/2020</a:t>
+              <a:t>6/6/2020</a:t>
             </a:fld>
             <a:endParaRPr lang="en-US"/>
           </a:p>
@@ -9546,7 +9546,7 @@
             <p:ph idx="1"/>
             <p:extLst>
               <p:ext uri="{D42A27DB-BD31-4B8C-83A1-F6EECF244321}">
-                <p14:modId xmlns:p14="http://schemas.microsoft.com/office/powerpoint/2010/main" val="83980027"/>
+                <p14:modId xmlns:p14="http://schemas.microsoft.com/office/powerpoint/2010/main" val="4051997959"/>
               </p:ext>
             </p:extLst>
           </p:nvPr>
@@ -10189,9 +10189,10 @@
                     <a:p>
                       <a:pPr algn="ctr"/>
                       <a:r>
-                        <a:rPr lang="en-US" dirty="0"/>
-                        <a:t>Final keywords</a:t>
+                        <a:rPr lang="en-US"/>
+                        <a:t>Final keyword</a:t>
                       </a:r>
+                      <a:endParaRPr lang="en-US" dirty="0"/>
                     </a:p>
                   </a:txBody>
                   <a:tcPr/>
@@ -10976,7 +10977,7 @@
                   </a:outerShdw>
                 </a:effectLst>
               </a:rPr>
-              <a:t>whatsapp</a:t>
+              <a:t>Whatsapp</a:t>
             </a:r>
             <a:r>
               <a:rPr lang="en-US" sz="5400" cap="none" dirty="0">
@@ -11047,9 +11048,7 @@
               </a:rPr>
               <a:t>sanchitamishra170676@gmail.com</a:t>
             </a:r>
-          </a:p>
-          <a:p>
-            <a:endParaRPr lang="en-US" sz="5400" cap="none" dirty="0">
+            <a:endParaRPr lang="en-US" sz="1050" cap="none" dirty="0">
               <a:ln w="0"/>
               <a:solidFill>
                 <a:schemeClr val="tx1"/>
@@ -11104,7 +11103,7 @@
                   </a:outerShdw>
                 </a:effectLst>
               </a:rPr>
-              <a:t>ppt available at : </a:t>
+              <a:t>PPT available at : </a:t>
             </a:r>
           </a:p>
           <a:p>
@@ -11188,6 +11187,65 @@
           </a:p>
           <a:p>
             <a:endParaRPr lang="en-US" dirty="0"/>
+          </a:p>
+        </p:txBody>
+      </p:sp>
+      <p:sp>
+        <p:nvSpPr>
+          <p:cNvPr id="6" name="TextBox 5">
+            <a:extLst>
+              <a:ext uri="{FF2B5EF4-FFF2-40B4-BE49-F238E27FC236}">
+                <a16:creationId xmlns:a16="http://schemas.microsoft.com/office/drawing/2014/main" id="{C99D0C1C-1E51-4B60-A266-99D7CB631A56}"/>
+              </a:ext>
+            </a:extLst>
+          </p:cNvPr>
+          <p:cNvSpPr txBox="1"/>
+          <p:nvPr/>
+        </p:nvSpPr>
+        <p:spPr>
+          <a:xfrm>
+            <a:off x="1166796" y="5584885"/>
+            <a:ext cx="5225126" cy="738664"/>
+          </a:xfrm>
+          <a:prstGeom prst="rect">
+            <a:avLst/>
+          </a:prstGeom>
+          <a:noFill/>
+        </p:spPr>
+        <p:txBody>
+          <a:bodyPr wrap="square" rtlCol="0">
+            <a:spAutoFit/>
+          </a:bodyPr>
+          <a:lstStyle/>
+          <a:p>
+            <a:r>
+              <a:rPr lang="en-US" sz="2400" b="1" dirty="0">
+                <a:ln w="0"/>
+                <a:effectLst>
+                  <a:outerShdw blurRad="38100" dist="19050" dir="2700000" algn="tl" rotWithShape="0">
+                    <a:schemeClr val="dk1">
+                      <a:alpha val="40000"/>
+                    </a:schemeClr>
+                  </a:outerShdw>
+                </a:effectLst>
+              </a:rPr>
+              <a:t>Certificate link:</a:t>
+            </a:r>
+          </a:p>
+          <a:p>
+            <a:r>
+              <a:rPr lang="en-US" i="1" dirty="0">
+                <a:ln w="0"/>
+                <a:effectLst>
+                  <a:outerShdw blurRad="38100" dist="19050" dir="2700000" algn="tl" rotWithShape="0">
+                    <a:schemeClr val="dk1">
+                      <a:alpha val="40000"/>
+                    </a:schemeClr>
+                  </a:outerShdw>
+                </a:effectLst>
+              </a:rPr>
+              <a:t>https://forms.gle/ZvXpGKU7X5GUWBag6</a:t>
+            </a:r>
           </a:p>
         </p:txBody>
       </p:sp>

</xml_diff>